<commit_message>
Minor corrections / improvements
</commit_message>
<xml_diff>
--- a/lectures/Lecture04/Lecture04.pptx
+++ b/lectures/Lecture04/Lecture04.pptx
@@ -1704,7 +1704,31 @@
                 <a:ea typeface="+mn-ea"/>
                 <a:cs typeface="+mn-cs"/>
               </a:rPr>
-              <a:t>Attribute grammars provides with initial</a:t>
+              <a:t>Attribute </a:t>
+            </a:r>
+            <a:r>
+              <a:rPr lang="en-US" sz="1200" kern="1200" smtClean="0">
+                <a:solidFill>
+                  <a:schemeClr val="tx1"/>
+                </a:solidFill>
+                <a:effectLst/>
+                <a:latin typeface="Arial" panose="020B0604020202020204" pitchFamily="34" charset="0"/>
+                <a:ea typeface="+mn-ea"/>
+                <a:cs typeface="+mn-cs"/>
+              </a:rPr>
+              <a:t>grammars provide </a:t>
+            </a:r>
+            <a:r>
+              <a:rPr lang="en-US" sz="1200" kern="1200" dirty="0" smtClean="0">
+                <a:solidFill>
+                  <a:schemeClr val="tx1"/>
+                </a:solidFill>
+                <a:effectLst/>
+                <a:latin typeface="Arial" panose="020B0604020202020204" pitchFamily="34" charset="0"/>
+                <a:ea typeface="+mn-ea"/>
+                <a:cs typeface="+mn-cs"/>
+              </a:rPr>
+              <a:t>with initial</a:t>
             </a:r>
             <a:r>
               <a:rPr lang="en-US" sz="1200" kern="1200" baseline="0" dirty="0" smtClean="0">
@@ -9708,14 +9732,6 @@
               </a:rPr>
               <a:t>Symbol Management</a:t>
             </a:r>
-            <a:r>
-              <a:rPr lang="en-GB" sz="4000" b="1" dirty="0" smtClean="0">
-                <a:solidFill>
-                  <a:srgbClr val="3ECF29"/>
-                </a:solidFill>
-              </a:rPr>
-              <a:t/>
-            </a:r>
             <a:br>
               <a:rPr lang="en-GB" sz="4000" b="1" dirty="0" smtClean="0">
                 <a:solidFill>
@@ -9959,7 +9975,6 @@
               <a:rPr lang="en-US" sz="2000" b="0" dirty="0" smtClean="0"/>
               <a:t>Symbol table is the central repository creating the capacity to store and restore data about a given symbol and scope.</a:t>
             </a:r>
-            <a:endParaRPr lang="en-US" sz="2000" b="0" dirty="0" smtClean="0"/>
           </a:p>
         </p:txBody>
       </p:sp>
@@ -10121,7 +10136,6 @@
               <a:rPr lang="en-US" sz="2000" b="0" dirty="0" smtClean="0"/>
               <a:t>Semantic analysis builds a comprehensive data structure to store entities like types, classes, structures, variables, parameters, and more.</a:t>
             </a:r>
-            <a:endParaRPr lang="en-US" sz="2000" b="0" dirty="0" smtClean="0"/>
           </a:p>
         </p:txBody>
       </p:sp>
@@ -11507,11 +11521,7 @@
             </a:pPr>
             <a:r>
               <a:rPr lang="en-GB" dirty="0" smtClean="0"/>
-              <a:t>Opportune </a:t>
-            </a:r>
-            <a:r>
-              <a:rPr lang="en-GB" dirty="0" smtClean="0"/>
-              <a:t>Moments in Parsing!</a:t>
+              <a:t>Opportune Moments in Parsing!</a:t>
             </a:r>
             <a:endParaRPr lang="en-GB" dirty="0"/>
           </a:p>
@@ -12379,7 +12389,7 @@
         </p:blipFill>
         <p:spPr>
           <a:xfrm>
-            <a:off x="1585446" y="1370590"/>
+            <a:off x="1585446" y="1333376"/>
             <a:ext cx="7101354" cy="5487410"/>
           </a:xfrm>
           <a:prstGeom prst="rect">
@@ -12435,11 +12445,7 @@
           <a:p>
             <a:r>
               <a:rPr lang="en-GB" sz="1200" b="0" dirty="0" smtClean="0"/>
-              <a:t>Example from </a:t>
-            </a:r>
-            <a:r>
-              <a:rPr lang="en-GB" sz="1200" b="0" dirty="0" smtClean="0"/>
-              <a:t>“Douglas </a:t>
+              <a:t>Example from “Douglas </a:t>
             </a:r>
             <a:r>
               <a:rPr lang="en-GB" sz="1200" b="0" dirty="0" err="1" smtClean="0"/>
@@ -12459,7 +12465,11 @@
             </a:r>
             <a:r>
               <a:rPr lang="en-US" sz="1200" b="0" dirty="0" smtClean="0"/>
-              <a:t>Design, Chapter 4”</a:t>
+              <a:t>Design, Chapter </a:t>
+            </a:r>
+            <a:r>
+              <a:rPr lang="en-US" sz="1200" b="0" dirty="0" smtClean="0"/>
+              <a:t>6”</a:t>
             </a:r>
             <a:r>
               <a:rPr lang="en-US" sz="1200" dirty="0" smtClean="0"/>
@@ -14268,7 +14278,6 @@
               <a:rPr lang="en-GB" dirty="0" smtClean="0"/>
               <a:t>Paragraphs</a:t>
             </a:r>
-            <a:endParaRPr lang="en-GB" dirty="0" smtClean="0"/>
           </a:p>
           <a:p>
             <a:pPr marL="285750" indent="-285750">
@@ -14321,7 +14330,6 @@
               <a:rPr lang="en-GB" dirty="0" smtClean="0"/>
               <a:t>Constants</a:t>
             </a:r>
-            <a:endParaRPr lang="en-GB" dirty="0" smtClean="0"/>
           </a:p>
           <a:p>
             <a:pPr marL="285750" indent="-285750">
@@ -14335,7 +14343,6 @@
               <a:rPr lang="en-GB" dirty="0" smtClean="0"/>
               <a:t>…</a:t>
             </a:r>
-            <a:endParaRPr lang="en-GB" dirty="0" smtClean="0"/>
           </a:p>
         </p:txBody>
       </p:sp>
@@ -14501,11 +14508,7 @@
           <a:p>
             <a:r>
               <a:rPr lang="en-US" sz="2000" b="0" dirty="0" smtClean="0"/>
-              <a:t>Complete with respect to </a:t>
-            </a:r>
-            <a:r>
-              <a:rPr lang="en-US" sz="2000" b="0" dirty="0" smtClean="0"/>
-              <a:t>input.</a:t>
+              <a:t>Complete with respect to input.</a:t>
             </a:r>
           </a:p>
           <a:p>
@@ -14519,7 +14522,6 @@
               <a:rPr lang="en-US" sz="2000" b="0" dirty="0" smtClean="0"/>
               <a:t>Good enough to support subsequent phases.</a:t>
             </a:r>
-            <a:endParaRPr lang="en-US" sz="2000" b="0" dirty="0" smtClean="0"/>
           </a:p>
         </p:txBody>
       </p:sp>
@@ -14567,7 +14569,6 @@
               <a:rPr lang="en-GB" dirty="0" smtClean="0"/>
               <a:t>Types</a:t>
             </a:r>
-            <a:endParaRPr lang="en-GB" dirty="0" smtClean="0"/>
           </a:p>
           <a:p>
             <a:pPr marL="285750" indent="-285750">
@@ -14620,7 +14621,6 @@
               <a:rPr lang="en-GB" dirty="0" smtClean="0"/>
               <a:t>Constants</a:t>
             </a:r>
-            <a:endParaRPr lang="en-GB" dirty="0" smtClean="0"/>
           </a:p>
           <a:p>
             <a:pPr marL="285750" indent="-285750">
@@ -14634,7 +14634,6 @@
               <a:rPr lang="en-GB" dirty="0" smtClean="0"/>
               <a:t>…</a:t>
             </a:r>
-            <a:endParaRPr lang="en-GB" dirty="0" smtClean="0"/>
           </a:p>
         </p:txBody>
       </p:sp>

</xml_diff>